<commit_message>
Latest version of presentation PPT
</commit_message>
<xml_diff>
--- a/doc/CQRS_Akka.pptx
+++ b/doc/CQRS_Akka.pptx
@@ -206,7 +206,7 @@
           <a:p>
             <a:fld id="{3EADC7BD-5D74-D947-B9F4-DD73AAF4926A}" type="datetimeFigureOut">
               <a:rPr lang="en-US" smtClean="0"/>
-              <a:t>5/26/17</a:t>
+              <a:t>6/15/17</a:t>
             </a:fld>
             <a:endParaRPr lang="en-US"/>
           </a:p>
@@ -474,6 +474,90 @@
 </p:notesMaster>
 </file>
 
+<file path=ppt/notesSlides/notesSlide1.xml><?xml version="1.0" encoding="utf-8"?>
+<p:notes xmlns:a="http://schemas.openxmlformats.org/drawingml/2006/main" xmlns:r="http://schemas.openxmlformats.org/officeDocument/2006/relationships" xmlns:p="http://schemas.openxmlformats.org/presentationml/2006/main">
+  <p:cSld>
+    <p:spTree>
+      <p:nvGrpSpPr>
+        <p:cNvPr id="1" name=""/>
+        <p:cNvGrpSpPr/>
+        <p:nvPr/>
+      </p:nvGrpSpPr>
+      <p:grpSpPr>
+        <a:xfrm>
+          <a:off x="0" y="0"/>
+          <a:ext cx="0" cy="0"/>
+          <a:chOff x="0" y="0"/>
+          <a:chExt cx="0" cy="0"/>
+        </a:xfrm>
+      </p:grpSpPr>
+      <p:sp>
+        <p:nvSpPr>
+          <p:cNvPr id="2" name="Slide Image Placeholder 1"/>
+          <p:cNvSpPr>
+            <a:spLocks noGrp="1" noRot="1" noChangeAspect="1"/>
+          </p:cNvSpPr>
+          <p:nvPr>
+            <p:ph type="sldImg"/>
+          </p:nvPr>
+        </p:nvSpPr>
+        <p:spPr/>
+      </p:sp>
+      <p:sp>
+        <p:nvSpPr>
+          <p:cNvPr id="3" name="Notes Placeholder 2"/>
+          <p:cNvSpPr>
+            <a:spLocks noGrp="1"/>
+          </p:cNvSpPr>
+          <p:nvPr>
+            <p:ph type="body" idx="1"/>
+          </p:nvPr>
+        </p:nvSpPr>
+        <p:spPr/>
+        <p:txBody>
+          <a:bodyPr/>
+          <a:lstStyle/>
+          <a:p>
+            <a:endParaRPr lang="en-US" dirty="0"/>
+          </a:p>
+        </p:txBody>
+      </p:sp>
+      <p:sp>
+        <p:nvSpPr>
+          <p:cNvPr id="4" name="Slide Number Placeholder 3"/>
+          <p:cNvSpPr>
+            <a:spLocks noGrp="1"/>
+          </p:cNvSpPr>
+          <p:nvPr>
+            <p:ph type="sldNum" sz="quarter" idx="10"/>
+          </p:nvPr>
+        </p:nvSpPr>
+        <p:spPr/>
+        <p:txBody>
+          <a:bodyPr/>
+          <a:lstStyle/>
+          <a:p>
+            <a:fld id="{C21387CB-7311-AB44-A741-8CF1FFA62714}" type="slidenum">
+              <a:rPr lang="en-US" smtClean="0"/>
+              <a:t>10</a:t>
+            </a:fld>
+            <a:endParaRPr lang="en-US"/>
+          </a:p>
+        </p:txBody>
+      </p:sp>
+    </p:spTree>
+    <p:extLst>
+      <p:ext uri="{BB962C8B-B14F-4D97-AF65-F5344CB8AC3E}">
+        <p14:creationId xmlns:p14="http://schemas.microsoft.com/office/powerpoint/2010/main" val="129560601"/>
+      </p:ext>
+    </p:extLst>
+  </p:cSld>
+  <p:clrMapOvr>
+    <a:masterClrMapping/>
+  </p:clrMapOvr>
+</p:notes>
+</file>
+
 <file path=ppt/slideLayouts/slideLayout1.xml><?xml version="1.0" encoding="utf-8"?>
 <p:sldLayout xmlns:a="http://schemas.openxmlformats.org/drawingml/2006/main" xmlns:r="http://schemas.openxmlformats.org/officeDocument/2006/relationships" xmlns:p="http://schemas.openxmlformats.org/presentationml/2006/main" type="title" preserve="1">
   <p:cSld name="Title Slide">
@@ -605,7 +689,7 @@
           <a:p>
             <a:fld id="{898E539A-1CCA-A748-8CE0-605CC6B62B25}" type="datetimeFigureOut">
               <a:rPr lang="en-US" smtClean="0"/>
-              <a:t>5/26/17</a:t>
+              <a:t>6/15/17</a:t>
             </a:fld>
             <a:endParaRPr lang="en-US"/>
           </a:p>
@@ -775,7 +859,7 @@
           <a:p>
             <a:fld id="{898E539A-1CCA-A748-8CE0-605CC6B62B25}" type="datetimeFigureOut">
               <a:rPr lang="en-US" smtClean="0"/>
-              <a:t>5/26/17</a:t>
+              <a:t>6/15/17</a:t>
             </a:fld>
             <a:endParaRPr lang="en-US"/>
           </a:p>
@@ -955,7 +1039,7 @@
           <a:p>
             <a:fld id="{898E539A-1CCA-A748-8CE0-605CC6B62B25}" type="datetimeFigureOut">
               <a:rPr lang="en-US" smtClean="0"/>
-              <a:t>5/26/17</a:t>
+              <a:t>6/15/17</a:t>
             </a:fld>
             <a:endParaRPr lang="en-US"/>
           </a:p>
@@ -1125,7 +1209,7 @@
           <a:p>
             <a:fld id="{898E539A-1CCA-A748-8CE0-605CC6B62B25}" type="datetimeFigureOut">
               <a:rPr lang="en-US" smtClean="0"/>
-              <a:t>5/26/17</a:t>
+              <a:t>6/15/17</a:t>
             </a:fld>
             <a:endParaRPr lang="en-US"/>
           </a:p>
@@ -1371,7 +1455,7 @@
           <a:p>
             <a:fld id="{898E539A-1CCA-A748-8CE0-605CC6B62B25}" type="datetimeFigureOut">
               <a:rPr lang="en-US" smtClean="0"/>
-              <a:t>5/26/17</a:t>
+              <a:t>6/15/17</a:t>
             </a:fld>
             <a:endParaRPr lang="en-US"/>
           </a:p>
@@ -1603,7 +1687,7 @@
           <a:p>
             <a:fld id="{898E539A-1CCA-A748-8CE0-605CC6B62B25}" type="datetimeFigureOut">
               <a:rPr lang="en-US" smtClean="0"/>
-              <a:t>5/26/17</a:t>
+              <a:t>6/15/17</a:t>
             </a:fld>
             <a:endParaRPr lang="en-US"/>
           </a:p>
@@ -1970,7 +2054,7 @@
           <a:p>
             <a:fld id="{898E539A-1CCA-A748-8CE0-605CC6B62B25}" type="datetimeFigureOut">
               <a:rPr lang="en-US" smtClean="0"/>
-              <a:t>5/26/17</a:t>
+              <a:t>6/15/17</a:t>
             </a:fld>
             <a:endParaRPr lang="en-US"/>
           </a:p>
@@ -2088,7 +2172,7 @@
           <a:p>
             <a:fld id="{898E539A-1CCA-A748-8CE0-605CC6B62B25}" type="datetimeFigureOut">
               <a:rPr lang="en-US" smtClean="0"/>
-              <a:t>5/26/17</a:t>
+              <a:t>6/15/17</a:t>
             </a:fld>
             <a:endParaRPr lang="en-US"/>
           </a:p>
@@ -2183,7 +2267,7 @@
           <a:p>
             <a:fld id="{898E539A-1CCA-A748-8CE0-605CC6B62B25}" type="datetimeFigureOut">
               <a:rPr lang="en-US" smtClean="0"/>
-              <a:t>5/26/17</a:t>
+              <a:t>6/15/17</a:t>
             </a:fld>
             <a:endParaRPr lang="en-US"/>
           </a:p>
@@ -2460,7 +2544,7 @@
           <a:p>
             <a:fld id="{898E539A-1CCA-A748-8CE0-605CC6B62B25}" type="datetimeFigureOut">
               <a:rPr lang="en-US" smtClean="0"/>
-              <a:t>5/26/17</a:t>
+              <a:t>6/15/17</a:t>
             </a:fld>
             <a:endParaRPr lang="en-US"/>
           </a:p>
@@ -2713,7 +2797,7 @@
           <a:p>
             <a:fld id="{898E539A-1CCA-A748-8CE0-605CC6B62B25}" type="datetimeFigureOut">
               <a:rPr lang="en-US" smtClean="0"/>
-              <a:t>5/26/17</a:t>
+              <a:t>6/15/17</a:t>
             </a:fld>
             <a:endParaRPr lang="en-US"/>
           </a:p>
@@ -2926,7 +3010,7 @@
           <a:p>
             <a:fld id="{898E539A-1CCA-A748-8CE0-605CC6B62B25}" type="datetimeFigureOut">
               <a:rPr lang="en-US" smtClean="0"/>
-              <a:t>5/26/17</a:t>
+              <a:t>6/15/17</a:t>
             </a:fld>
             <a:endParaRPr lang="en-US"/>
           </a:p>
@@ -6619,7 +6703,7 @@
               <a:t>Flexibility: different techs on each side, different data stores (searching, big data, analytics, </a:t>
             </a:r>
             <a:r>
-              <a:rPr lang="en-US" dirty="0" err="1" smtClean="0"/>
+              <a:rPr lang="en-US" smtClean="0"/>
               <a:t>denormalised</a:t>
             </a:r>
             <a:r>
@@ -10730,13 +10814,7 @@
               <a:rPr lang="en-US" dirty="0" smtClean="0">
                 <a:sym typeface="Wingdings"/>
               </a:rPr>
-              <a:t>Command sourcing or </a:t>
-            </a:r>
-            <a:r>
-              <a:rPr lang="en-US" dirty="0" smtClean="0">
-                <a:sym typeface="Wingdings"/>
-              </a:rPr>
-              <a:t>Event-sourcing are natively supported</a:t>
+              <a:t>Command sourcing or Event-sourcing are natively supported</a:t>
             </a:r>
           </a:p>
           <a:p>
@@ -10755,9 +10833,6 @@
               </a:rPr>
               <a:t> Perfect candidate for implementation of CQRS / DDD</a:t>
             </a:r>
-            <a:endParaRPr lang="en-US" dirty="0" smtClean="0">
-              <a:sym typeface="Wingdings"/>
-            </a:endParaRPr>
           </a:p>
         </p:txBody>
       </p:sp>

</xml_diff>